<commit_message>
updated functions, images copied
</commit_message>
<xml_diff>
--- a/images/markedup_consort.pptx
+++ b/images/markedup_consort.pptx
@@ -5,12 +5,13 @@
     <p:sldMasterId id="2147483648" r:id="rId1"/>
   </p:sldMasterIdLst>
   <p:notesMasterIdLst>
-    <p:notesMasterId r:id="rId5"/>
+    <p:notesMasterId r:id="rId6"/>
   </p:notesMasterIdLst>
   <p:sldIdLst>
     <p:sldId id="257" r:id="rId2"/>
     <p:sldId id="256" r:id="rId3"/>
     <p:sldId id="258" r:id="rId4"/>
+    <p:sldId id="259" r:id="rId5"/>
   </p:sldIdLst>
   <p:sldSz cx="12192000" cy="6858000"/>
   <p:notesSz cx="6858000" cy="9144000"/>
@@ -5137,7 +5138,7 @@
           <p:nvPr>
             <p:extLst>
               <p:ext uri="{D42A27DB-BD31-4B8C-83A1-F6EECF244321}">
-                <p14:modId xmlns:p14="http://schemas.microsoft.com/office/powerpoint/2010/main" val="2458993333"/>
+                <p14:modId xmlns:p14="http://schemas.microsoft.com/office/powerpoint/2010/main" val="696677305"/>
               </p:ext>
             </p:extLst>
           </p:nvPr>
@@ -5967,6 +5968,1413 @@
     <p:extLst>
       <p:ext uri="{BB962C8B-B14F-4D97-AF65-F5344CB8AC3E}">
         <p14:creationId xmlns:p14="http://schemas.microsoft.com/office/powerpoint/2010/main" val="353096588"/>
+      </p:ext>
+    </p:extLst>
+  </p:cSld>
+  <p:clrMapOvr>
+    <a:masterClrMapping/>
+  </p:clrMapOvr>
+</p:sld>
+</file>
+
+<file path=ppt/slides/slide4.xml><?xml version="1.0" encoding="utf-8"?>
+<p:sld xmlns:a="http://schemas.openxmlformats.org/drawingml/2006/main" xmlns:r="http://schemas.openxmlformats.org/officeDocument/2006/relationships" xmlns:p="http://schemas.openxmlformats.org/presentationml/2006/main">
+  <p:cSld>
+    <p:spTree>
+      <p:nvGrpSpPr>
+        <p:cNvPr id="1" name=""/>
+        <p:cNvGrpSpPr/>
+        <p:nvPr/>
+      </p:nvGrpSpPr>
+      <p:grpSpPr>
+        <a:xfrm>
+          <a:off x="0" y="0"/>
+          <a:ext cx="0" cy="0"/>
+          <a:chOff x="0" y="0"/>
+          <a:chExt cx="0" cy="0"/>
+        </a:xfrm>
+      </p:grpSpPr>
+      <p:graphicFrame>
+        <p:nvGraphicFramePr>
+          <p:cNvPr id="2" name="Table 2">
+            <a:extLst>
+              <a:ext uri="{FF2B5EF4-FFF2-40B4-BE49-F238E27FC236}">
+                <a16:creationId xmlns:a16="http://schemas.microsoft.com/office/drawing/2014/main" id="{8606FD38-B806-C240-8D9E-B66F92CED86D}"/>
+              </a:ext>
+            </a:extLst>
+          </p:cNvPr>
+          <p:cNvGraphicFramePr>
+            <a:graphicFrameLocks noGrp="1"/>
+          </p:cNvGraphicFramePr>
+          <p:nvPr>
+            <p:extLst>
+              <p:ext uri="{D42A27DB-BD31-4B8C-83A1-F6EECF244321}">
+                <p14:modId xmlns:p14="http://schemas.microsoft.com/office/powerpoint/2010/main" val="2816408739"/>
+              </p:ext>
+            </p:extLst>
+          </p:nvPr>
+        </p:nvGraphicFramePr>
+        <p:xfrm>
+          <a:off x="1124608" y="2466340"/>
+          <a:ext cx="10384217" cy="2372360"/>
+        </p:xfrm>
+        <a:graphic>
+          <a:graphicData uri="http://schemas.openxmlformats.org/drawingml/2006/table">
+            <a:tbl>
+              <a:tblPr firstRow="1" bandRow="1">
+                <a:tableStyleId>{5C22544A-7EE6-4342-B048-85BDC9FD1C3A}</a:tableStyleId>
+              </a:tblPr>
+              <a:tblGrid>
+                <a:gridCol w="536026">
+                  <a:extLst>
+                    <a:ext uri="{9D8B030D-6E8A-4147-A177-3AD203B41FA5}">
+                      <a16:colId xmlns:a16="http://schemas.microsoft.com/office/drawing/2014/main" val="2096061445"/>
+                    </a:ext>
+                  </a:extLst>
+                </a:gridCol>
+                <a:gridCol w="1734207">
+                  <a:extLst>
+                    <a:ext uri="{9D8B030D-6E8A-4147-A177-3AD203B41FA5}">
+                      <a16:colId xmlns:a16="http://schemas.microsoft.com/office/drawing/2014/main" val="3014082919"/>
+                    </a:ext>
+                  </a:extLst>
+                </a:gridCol>
+                <a:gridCol w="430925">
+                  <a:extLst>
+                    <a:ext uri="{9D8B030D-6E8A-4147-A177-3AD203B41FA5}">
+                      <a16:colId xmlns:a16="http://schemas.microsoft.com/office/drawing/2014/main" val="1671496532"/>
+                    </a:ext>
+                  </a:extLst>
+                </a:gridCol>
+                <a:gridCol w="2007475">
+                  <a:extLst>
+                    <a:ext uri="{9D8B030D-6E8A-4147-A177-3AD203B41FA5}">
+                      <a16:colId xmlns:a16="http://schemas.microsoft.com/office/drawing/2014/main" val="760454935"/>
+                    </a:ext>
+                  </a:extLst>
+                </a:gridCol>
+                <a:gridCol w="651642">
+                  <a:extLst>
+                    <a:ext uri="{9D8B030D-6E8A-4147-A177-3AD203B41FA5}">
+                      <a16:colId xmlns:a16="http://schemas.microsoft.com/office/drawing/2014/main" val="2813056734"/>
+                    </a:ext>
+                  </a:extLst>
+                </a:gridCol>
+                <a:gridCol w="578069">
+                  <a:extLst>
+                    <a:ext uri="{9D8B030D-6E8A-4147-A177-3AD203B41FA5}">
+                      <a16:colId xmlns:a16="http://schemas.microsoft.com/office/drawing/2014/main" val="762549638"/>
+                    </a:ext>
+                  </a:extLst>
+                </a:gridCol>
+                <a:gridCol w="557048">
+                  <a:extLst>
+                    <a:ext uri="{9D8B030D-6E8A-4147-A177-3AD203B41FA5}">
+                      <a16:colId xmlns:a16="http://schemas.microsoft.com/office/drawing/2014/main" val="875713677"/>
+                    </a:ext>
+                  </a:extLst>
+                </a:gridCol>
+                <a:gridCol w="588579">
+                  <a:extLst>
+                    <a:ext uri="{9D8B030D-6E8A-4147-A177-3AD203B41FA5}">
+                      <a16:colId xmlns:a16="http://schemas.microsoft.com/office/drawing/2014/main" val="3391324704"/>
+                    </a:ext>
+                  </a:extLst>
+                </a:gridCol>
+                <a:gridCol w="557049">
+                  <a:extLst>
+                    <a:ext uri="{9D8B030D-6E8A-4147-A177-3AD203B41FA5}">
+                      <a16:colId xmlns:a16="http://schemas.microsoft.com/office/drawing/2014/main" val="2296887968"/>
+                    </a:ext>
+                  </a:extLst>
+                </a:gridCol>
+                <a:gridCol w="609600">
+                  <a:extLst>
+                    <a:ext uri="{9D8B030D-6E8A-4147-A177-3AD203B41FA5}">
+                      <a16:colId xmlns:a16="http://schemas.microsoft.com/office/drawing/2014/main" val="3107072083"/>
+                    </a:ext>
+                  </a:extLst>
+                </a:gridCol>
+                <a:gridCol w="588579">
+                  <a:extLst>
+                    <a:ext uri="{9D8B030D-6E8A-4147-A177-3AD203B41FA5}">
+                      <a16:colId xmlns:a16="http://schemas.microsoft.com/office/drawing/2014/main" val="1668836167"/>
+                    </a:ext>
+                  </a:extLst>
+                </a:gridCol>
+                <a:gridCol w="548465">
+                  <a:extLst>
+                    <a:ext uri="{9D8B030D-6E8A-4147-A177-3AD203B41FA5}">
+                      <a16:colId xmlns:a16="http://schemas.microsoft.com/office/drawing/2014/main" val="522059352"/>
+                    </a:ext>
+                  </a:extLst>
+                </a:gridCol>
+                <a:gridCol w="302873">
+                  <a:extLst>
+                    <a:ext uri="{9D8B030D-6E8A-4147-A177-3AD203B41FA5}">
+                      <a16:colId xmlns:a16="http://schemas.microsoft.com/office/drawing/2014/main" val="1066867681"/>
+                    </a:ext>
+                  </a:extLst>
+                </a:gridCol>
+                <a:gridCol w="693680">
+                  <a:extLst>
+                    <a:ext uri="{9D8B030D-6E8A-4147-A177-3AD203B41FA5}">
+                      <a16:colId xmlns:a16="http://schemas.microsoft.com/office/drawing/2014/main" val="208920031"/>
+                    </a:ext>
+                  </a:extLst>
+                </a:gridCol>
+              </a:tblGrid>
+              <a:tr h="370840">
+                <a:tc>
+                  <a:txBody>
+                    <a:bodyPr/>
+                    <a:lstStyle/>
+                    <a:p>
+                      <a:r>
+                        <a:rPr lang="en-US" sz="1400" dirty="0"/>
+                        <a:t>num</a:t>
+                      </a:r>
+                    </a:p>
+                  </a:txBody>
+                  <a:tcPr/>
+                </a:tc>
+                <a:tc>
+                  <a:txBody>
+                    <a:bodyPr/>
+                    <a:lstStyle/>
+                    <a:p>
+                      <a:r>
+                        <a:rPr lang="en-US" sz="1400" dirty="0"/>
+                        <a:t>name</a:t>
+                      </a:r>
+                    </a:p>
+                  </a:txBody>
+                  <a:tcPr/>
+                </a:tc>
+                <a:tc>
+                  <a:txBody>
+                    <a:bodyPr/>
+                    <a:lstStyle/>
+                    <a:p>
+                      <a:r>
+                        <a:rPr lang="en-US" sz="1400" dirty="0"/>
+                        <a:t>loc</a:t>
+                      </a:r>
+                    </a:p>
+                  </a:txBody>
+                  <a:tcPr/>
+                </a:tc>
+                <a:tc>
+                  <a:txBody>
+                    <a:bodyPr/>
+                    <a:lstStyle/>
+                    <a:p>
+                      <a:r>
+                        <a:rPr lang="en-US" sz="1400" dirty="0"/>
+                        <a:t>label</a:t>
+                      </a:r>
+                    </a:p>
+                  </a:txBody>
+                  <a:tcPr/>
+                </a:tc>
+                <a:tc>
+                  <a:txBody>
+                    <a:bodyPr/>
+                    <a:lstStyle/>
+                    <a:p>
+                      <a:r>
+                        <a:rPr lang="en-US" sz="1400" dirty="0" err="1"/>
+                        <a:t>max_char</a:t>
+                      </a:r>
+                      <a:endParaRPr lang="en-US" sz="1400" dirty="0"/>
+                    </a:p>
+                  </a:txBody>
+                  <a:tcPr/>
+                </a:tc>
+                <a:tc>
+                  <a:txBody>
+                    <a:bodyPr/>
+                    <a:lstStyle/>
+                    <a:p>
+                      <a:r>
+                        <a:rPr lang="en-US" sz="1400" dirty="0"/>
+                        <a:t>lines</a:t>
+                      </a:r>
+                    </a:p>
+                  </a:txBody>
+                  <a:tcPr/>
+                </a:tc>
+                <a:tc>
+                  <a:txBody>
+                    <a:bodyPr/>
+                    <a:lstStyle/>
+                    <a:p>
+                      <a:r>
+                        <a:rPr lang="en-US" sz="1400" dirty="0" err="1"/>
+                        <a:t>xmin</a:t>
+                      </a:r>
+                      <a:endParaRPr lang="en-US" sz="1400" dirty="0"/>
+                    </a:p>
+                  </a:txBody>
+                  <a:tcPr/>
+                </a:tc>
+                <a:tc>
+                  <a:txBody>
+                    <a:bodyPr/>
+                    <a:lstStyle/>
+                    <a:p>
+                      <a:r>
+                        <a:rPr lang="en-US" sz="1400" dirty="0" err="1"/>
+                        <a:t>xmax</a:t>
+                      </a:r>
+                      <a:endParaRPr lang="en-US" sz="1400" dirty="0"/>
+                    </a:p>
+                  </a:txBody>
+                  <a:tcPr/>
+                </a:tc>
+                <a:tc>
+                  <a:txBody>
+                    <a:bodyPr/>
+                    <a:lstStyle/>
+                    <a:p>
+                      <a:r>
+                        <a:rPr lang="en-US" sz="1400" dirty="0" err="1"/>
+                        <a:t>ymin</a:t>
+                      </a:r>
+                      <a:endParaRPr lang="en-US" sz="1400" dirty="0"/>
+                    </a:p>
+                  </a:txBody>
+                  <a:tcPr/>
+                </a:tc>
+                <a:tc>
+                  <a:txBody>
+                    <a:bodyPr/>
+                    <a:lstStyle/>
+                    <a:p>
+                      <a:r>
+                        <a:rPr lang="en-US" sz="1400" dirty="0" err="1"/>
+                        <a:t>ymax</a:t>
+                      </a:r>
+                      <a:endParaRPr lang="en-US" sz="1400" dirty="0"/>
+                    </a:p>
+                  </a:txBody>
+                  <a:tcPr/>
+                </a:tc>
+                <a:tc>
+                  <a:txBody>
+                    <a:bodyPr/>
+                    <a:lstStyle/>
+                    <a:p>
+                      <a:r>
+                        <a:rPr lang="en-US" sz="1400" dirty="0"/>
+                        <a:t>x</a:t>
+                      </a:r>
+                    </a:p>
+                  </a:txBody>
+                  <a:tcPr/>
+                </a:tc>
+                <a:tc>
+                  <a:txBody>
+                    <a:bodyPr/>
+                    <a:lstStyle/>
+                    <a:p>
+                      <a:r>
+                        <a:rPr lang="en-US" sz="1400" dirty="0" err="1"/>
+                        <a:t>xend</a:t>
+                      </a:r>
+                      <a:endParaRPr lang="en-US" sz="1400" dirty="0"/>
+                    </a:p>
+                  </a:txBody>
+                  <a:tcPr/>
+                </a:tc>
+                <a:tc>
+                  <a:txBody>
+                    <a:bodyPr/>
+                    <a:lstStyle/>
+                    <a:p>
+                      <a:r>
+                        <a:rPr lang="en-US" sz="1400" dirty="0"/>
+                        <a:t>y </a:t>
+                      </a:r>
+                    </a:p>
+                  </a:txBody>
+                  <a:tcPr/>
+                </a:tc>
+                <a:tc>
+                  <a:txBody>
+                    <a:bodyPr/>
+                    <a:lstStyle/>
+                    <a:p>
+                      <a:r>
+                        <a:rPr lang="en-US" sz="1400" dirty="0" err="1"/>
+                        <a:t>yend</a:t>
+                      </a:r>
+                      <a:endParaRPr lang="en-US" sz="1400" dirty="0"/>
+                    </a:p>
+                  </a:txBody>
+                  <a:tcPr/>
+                </a:tc>
+                <a:extLst>
+                  <a:ext uri="{0D108BD9-81ED-4DB2-BD59-A6C34878D82A}">
+                    <a16:rowId xmlns:a16="http://schemas.microsoft.com/office/drawing/2014/main" val="3433290893"/>
+                  </a:ext>
+                </a:extLst>
+              </a:tr>
+              <a:tr h="370840">
+                <a:tc>
+                  <a:txBody>
+                    <a:bodyPr/>
+                    <a:lstStyle/>
+                    <a:p>
+                      <a:r>
+                        <a:rPr lang="en-US" sz="1400" dirty="0"/>
+                        <a:t>51</a:t>
+                      </a:r>
+                    </a:p>
+                  </a:txBody>
+                  <a:tcPr/>
+                </a:tc>
+                <a:tc>
+                  <a:txBody>
+                    <a:bodyPr/>
+                    <a:lstStyle/>
+                    <a:p>
+                      <a:r>
+                        <a:rPr lang="en-US" sz="1400" dirty="0"/>
+                        <a:t>assignment_box_51</a:t>
+                      </a:r>
+                    </a:p>
+                  </a:txBody>
+                  <a:tcPr/>
+                </a:tc>
+                <a:tc>
+                  <a:txBody>
+                    <a:bodyPr/>
+                    <a:lstStyle/>
+                    <a:p>
+                      <a:r>
+                        <a:rPr lang="en-US" sz="1400" dirty="0"/>
+                        <a:t>-2</a:t>
+                      </a:r>
+                    </a:p>
+                  </a:txBody>
+                  <a:tcPr/>
+                </a:tc>
+                <a:tc>
+                  <a:txBody>
+                    <a:bodyPr/>
+                    <a:lstStyle/>
+                    <a:p>
+                      <a:r>
+                        <a:rPr lang="en-US" sz="1400" dirty="0"/>
+                        <a:t>46 patients assigned to…</a:t>
+                      </a:r>
+                    </a:p>
+                  </a:txBody>
+                  <a:tcPr/>
+                </a:tc>
+                <a:tc>
+                  <a:txBody>
+                    <a:bodyPr/>
+                    <a:lstStyle/>
+                    <a:p>
+                      <a:r>
+                        <a:rPr lang="en-US" sz="1400" dirty="0"/>
+                        <a:t>25</a:t>
+                      </a:r>
+                    </a:p>
+                  </a:txBody>
+                  <a:tcPr/>
+                </a:tc>
+                <a:tc>
+                  <a:txBody>
+                    <a:bodyPr/>
+                    <a:lstStyle/>
+                    <a:p>
+                      <a:r>
+                        <a:rPr lang="en-US" sz="1400" dirty="0"/>
+                        <a:t>2</a:t>
+                      </a:r>
+                    </a:p>
+                  </a:txBody>
+                  <a:tcPr/>
+                </a:tc>
+                <a:tc>
+                  <a:txBody>
+                    <a:bodyPr/>
+                    <a:lstStyle/>
+                    <a:p>
+                      <a:r>
+                        <a:rPr lang="en-US" sz="1400" dirty="0"/>
+                        <a:t>-120</a:t>
+                      </a:r>
+                    </a:p>
+                  </a:txBody>
+                  <a:tcPr/>
+                </a:tc>
+                <a:tc>
+                  <a:txBody>
+                    <a:bodyPr/>
+                    <a:lstStyle/>
+                    <a:p>
+                      <a:r>
+                        <a:rPr lang="en-US" sz="1400" dirty="0"/>
+                        <a:t>-80</a:t>
+                      </a:r>
+                    </a:p>
+                  </a:txBody>
+                  <a:tcPr/>
+                </a:tc>
+                <a:tc>
+                  <a:txBody>
+                    <a:bodyPr/>
+                    <a:lstStyle/>
+                    <a:p>
+                      <a:r>
+                        <a:rPr lang="en-US" sz="1400" dirty="0"/>
+                        <a:t>-40</a:t>
+                      </a:r>
+                    </a:p>
+                  </a:txBody>
+                  <a:tcPr/>
+                </a:tc>
+                <a:tc>
+                  <a:txBody>
+                    <a:bodyPr/>
+                    <a:lstStyle/>
+                    <a:p>
+                      <a:r>
+                        <a:rPr lang="en-US" sz="1400" dirty="0"/>
+                        <a:t>-20</a:t>
+                      </a:r>
+                    </a:p>
+                  </a:txBody>
+                  <a:tcPr/>
+                </a:tc>
+                <a:tc>
+                  <a:txBody>
+                    <a:bodyPr/>
+                    <a:lstStyle/>
+                    <a:p>
+                      <a:r>
+                        <a:rPr lang="en-US" sz="1400" dirty="0"/>
+                        <a:t>-100</a:t>
+                      </a:r>
+                    </a:p>
+                  </a:txBody>
+                  <a:tcPr/>
+                </a:tc>
+                <a:tc>
+                  <a:txBody>
+                    <a:bodyPr/>
+                    <a:lstStyle/>
+                    <a:p>
+                      <a:r>
+                        <a:rPr lang="en-US" sz="1400" dirty="0"/>
+                        <a:t>-100</a:t>
+                      </a:r>
+                    </a:p>
+                  </a:txBody>
+                  <a:tcPr/>
+                </a:tc>
+                <a:tc>
+                  <a:txBody>
+                    <a:bodyPr/>
+                    <a:lstStyle/>
+                    <a:p>
+                      <a:r>
+                        <a:rPr lang="en-US" sz="1400" dirty="0"/>
+                        <a:t>0</a:t>
+                      </a:r>
+                    </a:p>
+                  </a:txBody>
+                  <a:tcPr/>
+                </a:tc>
+                <a:tc>
+                  <a:txBody>
+                    <a:bodyPr/>
+                    <a:lstStyle/>
+                    <a:p>
+                      <a:r>
+                        <a:rPr lang="en-US" sz="1400" dirty="0"/>
+                        <a:t>-20</a:t>
+                      </a:r>
+                    </a:p>
+                  </a:txBody>
+                  <a:tcPr/>
+                </a:tc>
+                <a:extLst>
+                  <a:ext uri="{0D108BD9-81ED-4DB2-BD59-A6C34878D82A}">
+                    <a16:rowId xmlns:a16="http://schemas.microsoft.com/office/drawing/2014/main" val="2663680679"/>
+                  </a:ext>
+                </a:extLst>
+              </a:tr>
+              <a:tr h="370840">
+                <a:tc>
+                  <a:txBody>
+                    <a:bodyPr/>
+                    <a:lstStyle/>
+                    <a:p>
+                      <a:r>
+                        <a:rPr lang="en-US" sz="1400" dirty="0"/>
+                        <a:t>52</a:t>
+                      </a:r>
+                    </a:p>
+                  </a:txBody>
+                  <a:tcPr/>
+                </a:tc>
+                <a:tc>
+                  <a:txBody>
+                    <a:bodyPr/>
+                    <a:lstStyle/>
+                    <a:p>
+                      <a:r>
+                        <a:rPr lang="en-US" sz="1400" dirty="0"/>
+                        <a:t>assignment_box_52</a:t>
+                      </a:r>
+                    </a:p>
+                  </a:txBody>
+                  <a:tcPr/>
+                </a:tc>
+                <a:tc>
+                  <a:txBody>
+                    <a:bodyPr/>
+                    <a:lstStyle/>
+                    <a:p>
+                      <a:r>
+                        <a:rPr lang="en-US" sz="1400" dirty="0"/>
+                        <a:t>-1</a:t>
+                      </a:r>
+                    </a:p>
+                  </a:txBody>
+                  <a:tcPr/>
+                </a:tc>
+                <a:tc>
+                  <a:txBody>
+                    <a:bodyPr/>
+                    <a:lstStyle/>
+                    <a:p>
+                      <a:r>
+                        <a:rPr lang="en-US" sz="1400" dirty="0"/>
+                        <a:t>47 patients assigned to…</a:t>
+                      </a:r>
+                    </a:p>
+                  </a:txBody>
+                  <a:tcPr/>
+                </a:tc>
+                <a:tc>
+                  <a:txBody>
+                    <a:bodyPr/>
+                    <a:lstStyle/>
+                    <a:p>
+                      <a:r>
+                        <a:rPr lang="en-US" sz="1400" dirty="0"/>
+                        <a:t>25</a:t>
+                      </a:r>
+                    </a:p>
+                  </a:txBody>
+                  <a:tcPr/>
+                </a:tc>
+                <a:tc>
+                  <a:txBody>
+                    <a:bodyPr/>
+                    <a:lstStyle/>
+                    <a:p>
+                      <a:r>
+                        <a:rPr lang="en-US" sz="1400" dirty="0"/>
+                        <a:t>2</a:t>
+                      </a:r>
+                    </a:p>
+                  </a:txBody>
+                  <a:tcPr/>
+                </a:tc>
+                <a:tc>
+                  <a:txBody>
+                    <a:bodyPr/>
+                    <a:lstStyle/>
+                    <a:p>
+                      <a:r>
+                        <a:rPr lang="en-US" sz="1400" dirty="0"/>
+                        <a:t>-70</a:t>
+                      </a:r>
+                    </a:p>
+                  </a:txBody>
+                  <a:tcPr/>
+                </a:tc>
+                <a:tc>
+                  <a:txBody>
+                    <a:bodyPr/>
+                    <a:lstStyle/>
+                    <a:p>
+                      <a:r>
+                        <a:rPr lang="en-US" sz="1400" dirty="0"/>
+                        <a:t>-30</a:t>
+                      </a:r>
+                    </a:p>
+                  </a:txBody>
+                  <a:tcPr/>
+                </a:tc>
+                <a:tc>
+                  <a:txBody>
+                    <a:bodyPr/>
+                    <a:lstStyle/>
+                    <a:p>
+                      <a:r>
+                        <a:rPr lang="en-US" sz="1400" dirty="0"/>
+                        <a:t>-40</a:t>
+                      </a:r>
+                    </a:p>
+                  </a:txBody>
+                  <a:tcPr/>
+                </a:tc>
+                <a:tc>
+                  <a:txBody>
+                    <a:bodyPr/>
+                    <a:lstStyle/>
+                    <a:p>
+                      <a:r>
+                        <a:rPr lang="en-US" sz="1400" dirty="0"/>
+                        <a:t>-20</a:t>
+                      </a:r>
+                    </a:p>
+                  </a:txBody>
+                  <a:tcPr/>
+                </a:tc>
+                <a:tc>
+                  <a:txBody>
+                    <a:bodyPr/>
+                    <a:lstStyle/>
+                    <a:p>
+                      <a:r>
+                        <a:rPr lang="en-US" sz="1400" dirty="0"/>
+                        <a:t>-50</a:t>
+                      </a:r>
+                    </a:p>
+                  </a:txBody>
+                  <a:tcPr/>
+                </a:tc>
+                <a:tc>
+                  <a:txBody>
+                    <a:bodyPr/>
+                    <a:lstStyle/>
+                    <a:p>
+                      <a:r>
+                        <a:rPr lang="en-US" sz="1400" dirty="0"/>
+                        <a:t>-50</a:t>
+                      </a:r>
+                    </a:p>
+                  </a:txBody>
+                  <a:tcPr/>
+                </a:tc>
+                <a:tc>
+                  <a:txBody>
+                    <a:bodyPr/>
+                    <a:lstStyle/>
+                    <a:p>
+                      <a:r>
+                        <a:rPr lang="en-US" sz="1400" dirty="0"/>
+                        <a:t>0</a:t>
+                      </a:r>
+                    </a:p>
+                  </a:txBody>
+                  <a:tcPr/>
+                </a:tc>
+                <a:tc>
+                  <a:txBody>
+                    <a:bodyPr/>
+                    <a:lstStyle/>
+                    <a:p>
+                      <a:r>
+                        <a:rPr lang="en-US" sz="1400" dirty="0"/>
+                        <a:t>-20</a:t>
+                      </a:r>
+                    </a:p>
+                  </a:txBody>
+                  <a:tcPr/>
+                </a:tc>
+                <a:extLst>
+                  <a:ext uri="{0D108BD9-81ED-4DB2-BD59-A6C34878D82A}">
+                    <a16:rowId xmlns:a16="http://schemas.microsoft.com/office/drawing/2014/main" val="968977986"/>
+                  </a:ext>
+                </a:extLst>
+              </a:tr>
+              <a:tr h="370840">
+                <a:tc>
+                  <a:txBody>
+                    <a:bodyPr/>
+                    <a:lstStyle/>
+                    <a:p>
+                      <a:r>
+                        <a:rPr lang="en-US" sz="1400" dirty="0"/>
+                        <a:t>53</a:t>
+                      </a:r>
+                    </a:p>
+                  </a:txBody>
+                  <a:tcPr/>
+                </a:tc>
+                <a:tc>
+                  <a:txBody>
+                    <a:bodyPr/>
+                    <a:lstStyle/>
+                    <a:p>
+                      <a:r>
+                        <a:rPr lang="en-US" sz="1400" dirty="0"/>
+                        <a:t>assignment_box_53</a:t>
+                      </a:r>
+                    </a:p>
+                  </a:txBody>
+                  <a:tcPr/>
+                </a:tc>
+                <a:tc>
+                  <a:txBody>
+                    <a:bodyPr/>
+                    <a:lstStyle/>
+                    <a:p>
+                      <a:r>
+                        <a:rPr lang="en-US" sz="1400" dirty="0"/>
+                        <a:t>0</a:t>
+                      </a:r>
+                    </a:p>
+                  </a:txBody>
+                  <a:tcPr/>
+                </a:tc>
+                <a:tc>
+                  <a:txBody>
+                    <a:bodyPr/>
+                    <a:lstStyle/>
+                    <a:p>
+                      <a:r>
+                        <a:rPr lang="en-US" sz="1400" dirty="0"/>
+                        <a:t>49 patients assigned to…</a:t>
+                      </a:r>
+                    </a:p>
+                  </a:txBody>
+                  <a:tcPr/>
+                </a:tc>
+                <a:tc>
+                  <a:txBody>
+                    <a:bodyPr/>
+                    <a:lstStyle/>
+                    <a:p>
+                      <a:r>
+                        <a:rPr lang="en-US" sz="1400" dirty="0"/>
+                        <a:t>25</a:t>
+                      </a:r>
+                    </a:p>
+                  </a:txBody>
+                  <a:tcPr/>
+                </a:tc>
+                <a:tc>
+                  <a:txBody>
+                    <a:bodyPr/>
+                    <a:lstStyle/>
+                    <a:p>
+                      <a:r>
+                        <a:rPr lang="en-US" sz="1400" dirty="0"/>
+                        <a:t>2</a:t>
+                      </a:r>
+                    </a:p>
+                  </a:txBody>
+                  <a:tcPr/>
+                </a:tc>
+                <a:tc>
+                  <a:txBody>
+                    <a:bodyPr/>
+                    <a:lstStyle/>
+                    <a:p>
+                      <a:r>
+                        <a:rPr lang="en-US" sz="1400" dirty="0"/>
+                        <a:t>-20</a:t>
+                      </a:r>
+                    </a:p>
+                  </a:txBody>
+                  <a:tcPr/>
+                </a:tc>
+                <a:tc>
+                  <a:txBody>
+                    <a:bodyPr/>
+                    <a:lstStyle/>
+                    <a:p>
+                      <a:r>
+                        <a:rPr lang="en-US" sz="1400" dirty="0"/>
+                        <a:t>20</a:t>
+                      </a:r>
+                    </a:p>
+                  </a:txBody>
+                  <a:tcPr/>
+                </a:tc>
+                <a:tc>
+                  <a:txBody>
+                    <a:bodyPr/>
+                    <a:lstStyle/>
+                    <a:p>
+                      <a:r>
+                        <a:rPr lang="en-US" sz="1400" dirty="0"/>
+                        <a:t>-40</a:t>
+                      </a:r>
+                    </a:p>
+                  </a:txBody>
+                  <a:tcPr/>
+                </a:tc>
+                <a:tc>
+                  <a:txBody>
+                    <a:bodyPr/>
+                    <a:lstStyle/>
+                    <a:p>
+                      <a:r>
+                        <a:rPr lang="en-US" sz="1400" dirty="0"/>
+                        <a:t>-20</a:t>
+                      </a:r>
+                    </a:p>
+                  </a:txBody>
+                  <a:tcPr/>
+                </a:tc>
+                <a:tc>
+                  <a:txBody>
+                    <a:bodyPr/>
+                    <a:lstStyle/>
+                    <a:p>
+                      <a:r>
+                        <a:rPr lang="en-US" sz="1400" dirty="0"/>
+                        <a:t>0</a:t>
+                      </a:r>
+                    </a:p>
+                  </a:txBody>
+                  <a:tcPr/>
+                </a:tc>
+                <a:tc>
+                  <a:txBody>
+                    <a:bodyPr/>
+                    <a:lstStyle/>
+                    <a:p>
+                      <a:r>
+                        <a:rPr lang="en-US" sz="1400" dirty="0"/>
+                        <a:t>0</a:t>
+                      </a:r>
+                    </a:p>
+                  </a:txBody>
+                  <a:tcPr/>
+                </a:tc>
+                <a:tc>
+                  <a:txBody>
+                    <a:bodyPr/>
+                    <a:lstStyle/>
+                    <a:p>
+                      <a:r>
+                        <a:rPr lang="en-US" sz="1400" dirty="0"/>
+                        <a:t>0</a:t>
+                      </a:r>
+                    </a:p>
+                  </a:txBody>
+                  <a:tcPr/>
+                </a:tc>
+                <a:tc>
+                  <a:txBody>
+                    <a:bodyPr/>
+                    <a:lstStyle/>
+                    <a:p>
+                      <a:r>
+                        <a:rPr lang="en-US" sz="1400" dirty="0"/>
+                        <a:t>-20</a:t>
+                      </a:r>
+                    </a:p>
+                  </a:txBody>
+                  <a:tcPr/>
+                </a:tc>
+                <a:extLst>
+                  <a:ext uri="{0D108BD9-81ED-4DB2-BD59-A6C34878D82A}">
+                    <a16:rowId xmlns:a16="http://schemas.microsoft.com/office/drawing/2014/main" val="2971043142"/>
+                  </a:ext>
+                </a:extLst>
+              </a:tr>
+              <a:tr h="370840">
+                <a:tc>
+                  <a:txBody>
+                    <a:bodyPr/>
+                    <a:lstStyle/>
+                    <a:p>
+                      <a:r>
+                        <a:rPr lang="en-US" sz="1400" dirty="0"/>
+                        <a:t>54</a:t>
+                      </a:r>
+                    </a:p>
+                  </a:txBody>
+                  <a:tcPr/>
+                </a:tc>
+                <a:tc>
+                  <a:txBody>
+                    <a:bodyPr/>
+                    <a:lstStyle/>
+                    <a:p>
+                      <a:pPr marL="0" marR="0" lvl="0" indent="0" algn="l" defTabSz="914400" rtl="0" eaLnBrk="1" fontAlgn="auto" latinLnBrk="0" hangingPunct="1">
+                        <a:lnSpc>
+                          <a:spcPct val="100000"/>
+                        </a:lnSpc>
+                        <a:spcBef>
+                          <a:spcPts val="0"/>
+                        </a:spcBef>
+                        <a:spcAft>
+                          <a:spcPts val="0"/>
+                        </a:spcAft>
+                        <a:buClrTx/>
+                        <a:buSzTx/>
+                        <a:buFontTx/>
+                        <a:buNone/>
+                        <a:tabLst/>
+                        <a:defRPr/>
+                      </a:pPr>
+                      <a:r>
+                        <a:rPr lang="en-US" sz="1400" dirty="0"/>
+                        <a:t>assignment_box_54</a:t>
+                      </a:r>
+                    </a:p>
+                  </a:txBody>
+                  <a:tcPr/>
+                </a:tc>
+                <a:tc>
+                  <a:txBody>
+                    <a:bodyPr/>
+                    <a:lstStyle/>
+                    <a:p>
+                      <a:pPr marL="0" marR="0" lvl="0" indent="0" algn="l" defTabSz="914400" rtl="0" eaLnBrk="1" fontAlgn="auto" latinLnBrk="0" hangingPunct="1">
+                        <a:lnSpc>
+                          <a:spcPct val="100000"/>
+                        </a:lnSpc>
+                        <a:spcBef>
+                          <a:spcPts val="0"/>
+                        </a:spcBef>
+                        <a:spcAft>
+                          <a:spcPts val="0"/>
+                        </a:spcAft>
+                        <a:buClrTx/>
+                        <a:buSzTx/>
+                        <a:buFontTx/>
+                        <a:buNone/>
+                        <a:tabLst/>
+                        <a:defRPr/>
+                      </a:pPr>
+                      <a:r>
+                        <a:rPr lang="en-US" sz="1400" dirty="0"/>
+                        <a:t>1</a:t>
+                      </a:r>
+                    </a:p>
+                  </a:txBody>
+                  <a:tcPr/>
+                </a:tc>
+                <a:tc>
+                  <a:txBody>
+                    <a:bodyPr/>
+                    <a:lstStyle/>
+                    <a:p>
+                      <a:pPr marL="0" marR="0" lvl="0" indent="0" algn="l" defTabSz="914400" rtl="0" eaLnBrk="1" fontAlgn="auto" latinLnBrk="0" hangingPunct="1">
+                        <a:lnSpc>
+                          <a:spcPct val="100000"/>
+                        </a:lnSpc>
+                        <a:spcBef>
+                          <a:spcPts val="0"/>
+                        </a:spcBef>
+                        <a:spcAft>
+                          <a:spcPts val="0"/>
+                        </a:spcAft>
+                        <a:buClrTx/>
+                        <a:buSzTx/>
+                        <a:buFontTx/>
+                        <a:buNone/>
+                        <a:tabLst/>
+                        <a:defRPr/>
+                      </a:pPr>
+                      <a:r>
+                        <a:rPr lang="en-US" sz="1400" dirty="0"/>
+                        <a:t>52 patients assigned to…</a:t>
+                      </a:r>
+                    </a:p>
+                  </a:txBody>
+                  <a:tcPr/>
+                </a:tc>
+                <a:tc>
+                  <a:txBody>
+                    <a:bodyPr/>
+                    <a:lstStyle/>
+                    <a:p>
+                      <a:r>
+                        <a:rPr lang="en-US" sz="1400" dirty="0"/>
+                        <a:t>25</a:t>
+                      </a:r>
+                    </a:p>
+                  </a:txBody>
+                  <a:tcPr/>
+                </a:tc>
+                <a:tc>
+                  <a:txBody>
+                    <a:bodyPr/>
+                    <a:lstStyle/>
+                    <a:p>
+                      <a:r>
+                        <a:rPr lang="en-US" sz="1400" dirty="0"/>
+                        <a:t>2</a:t>
+                      </a:r>
+                    </a:p>
+                  </a:txBody>
+                  <a:tcPr/>
+                </a:tc>
+                <a:tc>
+                  <a:txBody>
+                    <a:bodyPr/>
+                    <a:lstStyle/>
+                    <a:p>
+                      <a:r>
+                        <a:rPr lang="en-US" sz="1400" dirty="0"/>
+                        <a:t>30</a:t>
+                      </a:r>
+                    </a:p>
+                  </a:txBody>
+                  <a:tcPr/>
+                </a:tc>
+                <a:tc>
+                  <a:txBody>
+                    <a:bodyPr/>
+                    <a:lstStyle/>
+                    <a:p>
+                      <a:r>
+                        <a:rPr lang="en-US" sz="1400" dirty="0"/>
+                        <a:t>70</a:t>
+                      </a:r>
+                    </a:p>
+                  </a:txBody>
+                  <a:tcPr/>
+                </a:tc>
+                <a:tc>
+                  <a:txBody>
+                    <a:bodyPr/>
+                    <a:lstStyle/>
+                    <a:p>
+                      <a:r>
+                        <a:rPr lang="en-US" sz="1400" dirty="0"/>
+                        <a:t>-40</a:t>
+                      </a:r>
+                    </a:p>
+                  </a:txBody>
+                  <a:tcPr/>
+                </a:tc>
+                <a:tc>
+                  <a:txBody>
+                    <a:bodyPr/>
+                    <a:lstStyle/>
+                    <a:p>
+                      <a:r>
+                        <a:rPr lang="en-US" sz="1400" dirty="0"/>
+                        <a:t>-20</a:t>
+                      </a:r>
+                    </a:p>
+                  </a:txBody>
+                  <a:tcPr/>
+                </a:tc>
+                <a:tc>
+                  <a:txBody>
+                    <a:bodyPr/>
+                    <a:lstStyle/>
+                    <a:p>
+                      <a:r>
+                        <a:rPr lang="en-US" sz="1400" dirty="0"/>
+                        <a:t>50</a:t>
+                      </a:r>
+                    </a:p>
+                  </a:txBody>
+                  <a:tcPr/>
+                </a:tc>
+                <a:tc>
+                  <a:txBody>
+                    <a:bodyPr/>
+                    <a:lstStyle/>
+                    <a:p>
+                      <a:r>
+                        <a:rPr lang="en-US" sz="1400" dirty="0"/>
+                        <a:t>50</a:t>
+                      </a:r>
+                    </a:p>
+                  </a:txBody>
+                  <a:tcPr/>
+                </a:tc>
+                <a:tc>
+                  <a:txBody>
+                    <a:bodyPr/>
+                    <a:lstStyle/>
+                    <a:p>
+                      <a:r>
+                        <a:rPr lang="en-US" sz="1400" dirty="0"/>
+                        <a:t>0</a:t>
+                      </a:r>
+                    </a:p>
+                  </a:txBody>
+                  <a:tcPr/>
+                </a:tc>
+                <a:tc>
+                  <a:txBody>
+                    <a:bodyPr/>
+                    <a:lstStyle/>
+                    <a:p>
+                      <a:r>
+                        <a:rPr lang="en-US" sz="1400" dirty="0"/>
+                        <a:t>-20</a:t>
+                      </a:r>
+                    </a:p>
+                  </a:txBody>
+                  <a:tcPr/>
+                </a:tc>
+                <a:extLst>
+                  <a:ext uri="{0D108BD9-81ED-4DB2-BD59-A6C34878D82A}">
+                    <a16:rowId xmlns:a16="http://schemas.microsoft.com/office/drawing/2014/main" val="319768332"/>
+                  </a:ext>
+                </a:extLst>
+              </a:tr>
+              <a:tr h="370840">
+                <a:tc>
+                  <a:txBody>
+                    <a:bodyPr/>
+                    <a:lstStyle/>
+                    <a:p>
+                      <a:r>
+                        <a:rPr lang="en-US" sz="1400" dirty="0"/>
+                        <a:t>55</a:t>
+                      </a:r>
+                    </a:p>
+                  </a:txBody>
+                  <a:tcPr/>
+                </a:tc>
+                <a:tc>
+                  <a:txBody>
+                    <a:bodyPr/>
+                    <a:lstStyle/>
+                    <a:p>
+                      <a:pPr marL="0" marR="0" lvl="0" indent="0" algn="l" defTabSz="914400" rtl="0" eaLnBrk="1" fontAlgn="auto" latinLnBrk="0" hangingPunct="1">
+                        <a:lnSpc>
+                          <a:spcPct val="100000"/>
+                        </a:lnSpc>
+                        <a:spcBef>
+                          <a:spcPts val="0"/>
+                        </a:spcBef>
+                        <a:spcAft>
+                          <a:spcPts val="0"/>
+                        </a:spcAft>
+                        <a:buClrTx/>
+                        <a:buSzTx/>
+                        <a:buFontTx/>
+                        <a:buNone/>
+                        <a:tabLst/>
+                        <a:defRPr/>
+                      </a:pPr>
+                      <a:r>
+                        <a:rPr lang="en-US" sz="1400" dirty="0"/>
+                        <a:t>assignment_box_55</a:t>
+                      </a:r>
+                    </a:p>
+                  </a:txBody>
+                  <a:tcPr/>
+                </a:tc>
+                <a:tc>
+                  <a:txBody>
+                    <a:bodyPr/>
+                    <a:lstStyle/>
+                    <a:p>
+                      <a:pPr marL="0" marR="0" lvl="0" indent="0" algn="l" defTabSz="914400" rtl="0" eaLnBrk="1" fontAlgn="auto" latinLnBrk="0" hangingPunct="1">
+                        <a:lnSpc>
+                          <a:spcPct val="100000"/>
+                        </a:lnSpc>
+                        <a:spcBef>
+                          <a:spcPts val="0"/>
+                        </a:spcBef>
+                        <a:spcAft>
+                          <a:spcPts val="0"/>
+                        </a:spcAft>
+                        <a:buClrTx/>
+                        <a:buSzTx/>
+                        <a:buFontTx/>
+                        <a:buNone/>
+                        <a:tabLst/>
+                        <a:defRPr/>
+                      </a:pPr>
+                      <a:r>
+                        <a:rPr lang="en-US" sz="1400" dirty="0"/>
+                        <a:t>2</a:t>
+                      </a:r>
+                    </a:p>
+                  </a:txBody>
+                  <a:tcPr/>
+                </a:tc>
+                <a:tc>
+                  <a:txBody>
+                    <a:bodyPr/>
+                    <a:lstStyle/>
+                    <a:p>
+                      <a:pPr marL="0" marR="0" lvl="0" indent="0" algn="l" defTabSz="914400" rtl="0" eaLnBrk="1" fontAlgn="auto" latinLnBrk="0" hangingPunct="1">
+                        <a:lnSpc>
+                          <a:spcPct val="100000"/>
+                        </a:lnSpc>
+                        <a:spcBef>
+                          <a:spcPts val="0"/>
+                        </a:spcBef>
+                        <a:spcAft>
+                          <a:spcPts val="0"/>
+                        </a:spcAft>
+                        <a:buClrTx/>
+                        <a:buSzTx/>
+                        <a:buFontTx/>
+                        <a:buNone/>
+                        <a:tabLst/>
+                        <a:defRPr/>
+                      </a:pPr>
+                      <a:r>
+                        <a:rPr lang="en-US" sz="1400" dirty="0"/>
+                        <a:t>56 patients assigned to…</a:t>
+                      </a:r>
+                    </a:p>
+                  </a:txBody>
+                  <a:tcPr/>
+                </a:tc>
+                <a:tc>
+                  <a:txBody>
+                    <a:bodyPr/>
+                    <a:lstStyle/>
+                    <a:p>
+                      <a:r>
+                        <a:rPr lang="en-US" sz="1400" dirty="0"/>
+                        <a:t>25</a:t>
+                      </a:r>
+                    </a:p>
+                  </a:txBody>
+                  <a:tcPr/>
+                </a:tc>
+                <a:tc>
+                  <a:txBody>
+                    <a:bodyPr/>
+                    <a:lstStyle/>
+                    <a:p>
+                      <a:r>
+                        <a:rPr lang="en-US" sz="1400" dirty="0"/>
+                        <a:t>2</a:t>
+                      </a:r>
+                    </a:p>
+                  </a:txBody>
+                  <a:tcPr/>
+                </a:tc>
+                <a:tc>
+                  <a:txBody>
+                    <a:bodyPr/>
+                    <a:lstStyle/>
+                    <a:p>
+                      <a:r>
+                        <a:rPr lang="en-US" sz="1400" dirty="0"/>
+                        <a:t>80</a:t>
+                      </a:r>
+                    </a:p>
+                  </a:txBody>
+                  <a:tcPr/>
+                </a:tc>
+                <a:tc>
+                  <a:txBody>
+                    <a:bodyPr/>
+                    <a:lstStyle/>
+                    <a:p>
+                      <a:r>
+                        <a:rPr lang="en-US" sz="1400" dirty="0"/>
+                        <a:t>120</a:t>
+                      </a:r>
+                    </a:p>
+                  </a:txBody>
+                  <a:tcPr/>
+                </a:tc>
+                <a:tc>
+                  <a:txBody>
+                    <a:bodyPr/>
+                    <a:lstStyle/>
+                    <a:p>
+                      <a:r>
+                        <a:rPr lang="en-US" sz="1400" dirty="0"/>
+                        <a:t>-40</a:t>
+                      </a:r>
+                    </a:p>
+                  </a:txBody>
+                  <a:tcPr/>
+                </a:tc>
+                <a:tc>
+                  <a:txBody>
+                    <a:bodyPr/>
+                    <a:lstStyle/>
+                    <a:p>
+                      <a:r>
+                        <a:rPr lang="en-US" sz="1400" dirty="0"/>
+                        <a:t>-20</a:t>
+                      </a:r>
+                    </a:p>
+                  </a:txBody>
+                  <a:tcPr/>
+                </a:tc>
+                <a:tc>
+                  <a:txBody>
+                    <a:bodyPr/>
+                    <a:lstStyle/>
+                    <a:p>
+                      <a:r>
+                        <a:rPr lang="en-US" sz="1400" dirty="0"/>
+                        <a:t>100</a:t>
+                      </a:r>
+                    </a:p>
+                  </a:txBody>
+                  <a:tcPr/>
+                </a:tc>
+                <a:tc>
+                  <a:txBody>
+                    <a:bodyPr/>
+                    <a:lstStyle/>
+                    <a:p>
+                      <a:r>
+                        <a:rPr lang="en-US" sz="1400" dirty="0"/>
+                        <a:t>100</a:t>
+                      </a:r>
+                    </a:p>
+                  </a:txBody>
+                  <a:tcPr/>
+                </a:tc>
+                <a:tc>
+                  <a:txBody>
+                    <a:bodyPr/>
+                    <a:lstStyle/>
+                    <a:p>
+                      <a:r>
+                        <a:rPr lang="en-US" sz="1400" dirty="0"/>
+                        <a:t>0</a:t>
+                      </a:r>
+                    </a:p>
+                  </a:txBody>
+                  <a:tcPr/>
+                </a:tc>
+                <a:tc>
+                  <a:txBody>
+                    <a:bodyPr/>
+                    <a:lstStyle/>
+                    <a:p>
+                      <a:r>
+                        <a:rPr lang="en-US" sz="1400" dirty="0"/>
+                        <a:t>-20</a:t>
+                      </a:r>
+                    </a:p>
+                  </a:txBody>
+                  <a:tcPr/>
+                </a:tc>
+                <a:extLst>
+                  <a:ext uri="{0D108BD9-81ED-4DB2-BD59-A6C34878D82A}">
+                    <a16:rowId xmlns:a16="http://schemas.microsoft.com/office/drawing/2014/main" val="690683879"/>
+                  </a:ext>
+                </a:extLst>
+              </a:tr>
+            </a:tbl>
+          </a:graphicData>
+        </a:graphic>
+      </p:graphicFrame>
+    </p:spTree>
+    <p:extLst>
+      <p:ext uri="{BB962C8B-B14F-4D97-AF65-F5344CB8AC3E}">
+        <p14:creationId xmlns:p14="http://schemas.microsoft.com/office/powerpoint/2010/main" val="3712864054"/>
       </p:ext>
     </p:extLst>
   </p:cSld>

</xml_diff>